<commit_message>
added comment to python file about database connection settings
</commit_message>
<xml_diff>
--- a/GordysNoveltiesPresentation.pptx
+++ b/GordysNoveltiesPresentation.pptx
@@ -3,12 +3,13 @@
 <p:presentation xmlns:a="http://schemas.openxmlformats.org/drawingml/2006/main" xmlns:p="http://schemas.openxmlformats.org/presentationml/2006/main" xmlns:r="http://schemas.openxmlformats.org/officeDocument/2006/relationships" xmlns:p14="http://schemas.microsoft.com/office/powerpoint/2010/main" xmlns:p15="http://schemas.microsoft.com/office/powerpoint/2012/main" xmlns:mc="http://schemas.openxmlformats.org/markup-compatibility/2006">
   <p:sldMasterIdLst>
     <p:sldMasterId id="2147483648" r:id="rId2"/>
+    <p:sldMasterId id="2147483650" r:id="rId3"/>
   </p:sldMasterIdLst>
   <p:sldIdLst>
-    <p:sldId id="256" r:id="rId3"/>
-    <p:sldId id="257" r:id="rId4"/>
-    <p:sldId id="258" r:id="rId5"/>
-    <p:sldId id="259" r:id="rId6"/>
+    <p:sldId id="256" r:id="rId4"/>
+    <p:sldId id="257" r:id="rId5"/>
+    <p:sldId id="258" r:id="rId6"/>
+    <p:sldId id="259" r:id="rId7"/>
   </p:sldIdLst>
   <p:sldSz cx="10080625" cy="5670550"/>
   <p:notesSz cx="7772400" cy="10058400"/>
@@ -45,7 +46,7 @@
         <p:spPr>
           <a:xfrm>
             <a:off x="504000" y="226080"/>
-            <a:ext cx="9071640" cy="946440"/>
+            <a:ext cx="9070920" cy="945720"/>
           </a:xfrm>
           <a:prstGeom prst="rect">
             <a:avLst/>
@@ -86,7 +87,7 @@
         <p:spPr>
           <a:xfrm>
             <a:off x="504000" y="1326600"/>
-            <a:ext cx="9071640" cy="3288240"/>
+            <a:ext cx="9070920" cy="3287520"/>
           </a:xfrm>
           <a:prstGeom prst="rect">
             <a:avLst/>
@@ -124,7 +125,7 @@
             <a:spLocks noGrp="1"/>
           </p:cNvSpPr>
           <p:nvPr>
-            <p:ph type="ftr" idx="2"/>
+            <p:ph type="ftr" idx="1"/>
           </p:nvPr>
         </p:nvSpPr>
         <p:spPr/>
@@ -144,14 +145,14 @@
             <a:spLocks noGrp="1"/>
           </p:cNvSpPr>
           <p:nvPr>
-            <p:ph type="sldNum" idx="3"/>
+            <p:ph type="sldNum" idx="2"/>
           </p:nvPr>
         </p:nvSpPr>
         <p:spPr/>
         <p:txBody>
           <a:bodyPr/>
           <a:p>
-            <a:fld id="{A0F16F3F-545F-4AAE-8FE1-DF8CBEF71543}" type="slidenum">
+            <a:fld id="{3795130F-ECD3-4652-BE8A-7FF249F6C95E}" type="slidenum">
               <a:t>&lt;#&gt;</a:t>
             </a:fld>
           </a:p>
@@ -164,7 +165,7 @@
             <a:spLocks noGrp="1"/>
           </p:cNvSpPr>
           <p:nvPr>
-            <p:ph type="dt" idx="1"/>
+            <p:ph type="dt" idx="3"/>
           </p:nvPr>
         </p:nvSpPr>
         <p:spPr/>
@@ -185,7 +186,7 @@
 
 <file path=ppt/slideLayouts/slideLayout2.xml><?xml version="1.0" encoding="utf-8"?>
 <p:sldLayout xmlns:a="http://schemas.openxmlformats.org/drawingml/2006/main" xmlns:p="http://schemas.openxmlformats.org/presentationml/2006/main" xmlns:r="http://schemas.openxmlformats.org/officeDocument/2006/relationships" xmlns:p14="http://schemas.microsoft.com/office/powerpoint/2010/main" xmlns:p15="http://schemas.microsoft.com/office/powerpoint/2012/main" xmlns:mc="http://schemas.openxmlformats.org/markup-compatibility/2006" type="title" preserve="1">
-  <p:cSld name="Default">
+  <p:cSld name="Default 1">
     <p:spTree>
       <p:nvGrpSpPr>
         <p:cNvPr id="1" name=""/>
@@ -202,7 +203,7 @@
       </p:grpSpPr>
       <p:sp>
         <p:nvSpPr>
-          <p:cNvPr id="7" name="PlaceHolder 1"/>
+          <p:cNvPr id="12" name="PlaceHolder 1"/>
           <p:cNvSpPr>
             <a:spLocks noGrp="1"/>
           </p:cNvSpPr>
@@ -213,7 +214,7 @@
         <p:spPr>
           <a:xfrm>
             <a:off x="504000" y="226080"/>
-            <a:ext cx="9071640" cy="946440"/>
+            <a:ext cx="9070920" cy="945720"/>
           </a:xfrm>
           <a:prstGeom prst="rect">
             <a:avLst/>
@@ -243,7 +244,7 @@
       </p:sp>
       <p:sp>
         <p:nvSpPr>
-          <p:cNvPr id="8" name="PlaceHolder 2"/>
+          <p:cNvPr id="13" name="PlaceHolder 2"/>
           <p:cNvSpPr>
             <a:spLocks noGrp="1"/>
           </p:cNvSpPr>
@@ -254,7 +255,7 @@
         <p:spPr>
           <a:xfrm>
             <a:off x="504000" y="1326600"/>
-            <a:ext cx="9071640" cy="3288240"/>
+            <a:ext cx="9070920" cy="3287520"/>
           </a:xfrm>
           <a:prstGeom prst="rect">
             <a:avLst/>
@@ -289,7 +290,7 @@
             <a:spLocks noGrp="1"/>
           </p:cNvSpPr>
           <p:nvPr>
-            <p:ph type="ftr" idx="2"/>
+            <p:ph type="ftr" idx="4"/>
           </p:nvPr>
         </p:nvSpPr>
         <p:spPr/>
@@ -309,14 +310,14 @@
             <a:spLocks noGrp="1"/>
           </p:cNvSpPr>
           <p:nvPr>
-            <p:ph type="sldNum" idx="3"/>
+            <p:ph type="sldNum" idx="5"/>
           </p:nvPr>
         </p:nvSpPr>
         <p:spPr/>
         <p:txBody>
           <a:bodyPr/>
           <a:p>
-            <a:fld id="{63F8219E-FEC4-415A-8EF6-6D8A01BAD1F2}" type="slidenum">
+            <a:fld id="{37878E97-7CE7-4FA0-B3AB-8628B6A7889B}" type="slidenum">
               <a:t>&lt;#&gt;</a:t>
             </a:fld>
           </a:p>
@@ -329,7 +330,7 @@
             <a:spLocks noGrp="1"/>
           </p:cNvSpPr>
           <p:nvPr>
-            <p:ph type="dt" idx="1"/>
+            <p:ph type="dt" idx="6"/>
           </p:nvPr>
         </p:nvSpPr>
         <p:spPr/>
@@ -378,7 +379,7 @@
         <p:spPr>
           <a:xfrm>
             <a:off x="504000" y="226080"/>
-            <a:ext cx="9071640" cy="946440"/>
+            <a:ext cx="9070920" cy="945720"/>
           </a:xfrm>
           <a:prstGeom prst="rect">
             <a:avLst/>
@@ -393,11 +394,11 @@
             <a:noAutofit/>
           </a:bodyPr>
           <a:p>
-            <a:pPr indent="0" algn="ctr">
+            <a:pPr indent="0">
               <a:buNone/>
             </a:pPr>
             <a:r>
-              <a:rPr b="0" lang="en-US" sz="4400" strike="noStrike" u="none">
+              <a:rPr b="0" lang="en-US" sz="1800" strike="noStrike" u="none">
                 <a:solidFill>
                   <a:srgbClr val="000000"/>
                 </a:solidFill>
@@ -406,7 +407,7 @@
               </a:rPr>
               <a:t>Click to edit the title text format</a:t>
             </a:r>
-            <a:endParaRPr b="0" lang="en-US" sz="4400" strike="noStrike" u="none">
+            <a:endParaRPr b="0" lang="en-US" sz="1800" strike="noStrike" u="none">
               <a:solidFill>
                 <a:srgbClr val="000000"/>
               </a:solidFill>
@@ -429,7 +430,7 @@
         <p:spPr>
           <a:xfrm>
             <a:off x="504000" y="1326600"/>
-            <a:ext cx="9071640" cy="3288240"/>
+            <a:ext cx="9070920" cy="3287520"/>
           </a:xfrm>
           <a:prstGeom prst="rect">
             <a:avLst/>
@@ -456,7 +457,7 @@
               <a:buChar char=""/>
             </a:pPr>
             <a:r>
-              <a:rPr b="0" lang="en-US" sz="3200" strike="noStrike" u="none">
+              <a:rPr b="0" lang="en-US" sz="1800" strike="noStrike" u="none">
                 <a:solidFill>
                   <a:srgbClr val="000000"/>
                 </a:solidFill>
@@ -465,7 +466,7 @@
               </a:rPr>
               <a:t>Click to edit the outline text format</a:t>
             </a:r>
-            <a:endParaRPr b="0" lang="en-US" sz="3200" strike="noStrike" u="none">
+            <a:endParaRPr b="0" lang="en-US" sz="1800" strike="noStrike" u="none">
               <a:solidFill>
                 <a:srgbClr val="000000"/>
               </a:solidFill>
@@ -486,7 +487,7 @@
               <a:buChar char=""/>
             </a:pPr>
             <a:r>
-              <a:rPr b="0" lang="en-US" sz="2800" strike="noStrike" u="none">
+              <a:rPr b="0" lang="en-US" sz="1800" strike="noStrike" u="none">
                 <a:solidFill>
                   <a:srgbClr val="000000"/>
                 </a:solidFill>
@@ -495,7 +496,7 @@
               </a:rPr>
               <a:t>Second Outline Level</a:t>
             </a:r>
-            <a:endParaRPr b="0" lang="en-US" sz="2800" strike="noStrike" u="none">
+            <a:endParaRPr b="0" lang="en-US" sz="1800" strike="noStrike" u="none">
               <a:solidFill>
                 <a:srgbClr val="000000"/>
               </a:solidFill>
@@ -516,7 +517,7 @@
               <a:buChar char=""/>
             </a:pPr>
             <a:r>
-              <a:rPr b="0" lang="en-US" sz="2400" strike="noStrike" u="none">
+              <a:rPr b="0" lang="en-US" sz="1800" strike="noStrike" u="none">
                 <a:solidFill>
                   <a:srgbClr val="000000"/>
                 </a:solidFill>
@@ -525,7 +526,7 @@
               </a:rPr>
               <a:t>Third Outline Level</a:t>
             </a:r>
-            <a:endParaRPr b="0" lang="en-US" sz="2400" strike="noStrike" u="none">
+            <a:endParaRPr b="0" lang="en-US" sz="1800" strike="noStrike" u="none">
               <a:solidFill>
                 <a:srgbClr val="000000"/>
               </a:solidFill>
@@ -546,7 +547,7 @@
               <a:buChar char=""/>
             </a:pPr>
             <a:r>
-              <a:rPr b="0" lang="en-US" sz="2000" strike="noStrike" u="none">
+              <a:rPr b="0" lang="en-US" sz="1800" strike="noStrike" u="none">
                 <a:solidFill>
                   <a:srgbClr val="000000"/>
                 </a:solidFill>
@@ -555,7 +556,7 @@
               </a:rPr>
               <a:t>Fourth Outline Level</a:t>
             </a:r>
-            <a:endParaRPr b="0" lang="en-US" sz="2000" strike="noStrike" u="none">
+            <a:endParaRPr b="0" lang="en-US" sz="1800" strike="noStrike" u="none">
               <a:solidFill>
                 <a:srgbClr val="000000"/>
               </a:solidFill>
@@ -576,7 +577,7 @@
               <a:buChar char=""/>
             </a:pPr>
             <a:r>
-              <a:rPr b="0" lang="en-US" sz="2000" strike="noStrike" u="none">
+              <a:rPr b="0" lang="en-US" sz="1800" strike="noStrike" u="none">
                 <a:solidFill>
                   <a:srgbClr val="000000"/>
                 </a:solidFill>
@@ -585,7 +586,7 @@
               </a:rPr>
               <a:t>Fifth Outline Level</a:t>
             </a:r>
-            <a:endParaRPr b="0" lang="en-US" sz="2000" strike="noStrike" u="none">
+            <a:endParaRPr b="0" lang="en-US" sz="1800" strike="noStrike" u="none">
               <a:solidFill>
                 <a:srgbClr val="000000"/>
               </a:solidFill>
@@ -606,7 +607,7 @@
               <a:buChar char=""/>
             </a:pPr>
             <a:r>
-              <a:rPr b="0" lang="en-US" sz="2000" strike="noStrike" u="none">
+              <a:rPr b="0" lang="en-US" sz="1800" strike="noStrike" u="none">
                 <a:solidFill>
                   <a:srgbClr val="000000"/>
                 </a:solidFill>
@@ -615,7 +616,7 @@
               </a:rPr>
               <a:t>Sixth Outline Level</a:t>
             </a:r>
-            <a:endParaRPr b="0" lang="en-US" sz="2000" strike="noStrike" u="none">
+            <a:endParaRPr b="0" lang="en-US" sz="1800" strike="noStrike" u="none">
               <a:solidFill>
                 <a:srgbClr val="000000"/>
               </a:solidFill>
@@ -636,7 +637,7 @@
               <a:buChar char=""/>
             </a:pPr>
             <a:r>
-              <a:rPr b="0" lang="en-US" sz="2000" strike="noStrike" u="none">
+              <a:rPr b="0" lang="en-US" sz="1800" strike="noStrike" u="none">
                 <a:solidFill>
                   <a:srgbClr val="000000"/>
                 </a:solidFill>
@@ -645,7 +646,7 @@
               </a:rPr>
               <a:t>Seventh Outline Level</a:t>
             </a:r>
-            <a:endParaRPr b="0" lang="en-US" sz="2000" strike="noStrike" u="none">
+            <a:endParaRPr b="0" lang="en-US" sz="1800" strike="noStrike" u="none">
               <a:solidFill>
                 <a:srgbClr val="000000"/>
               </a:solidFill>
@@ -662,13 +663,163 @@
             <a:spLocks noGrp="1"/>
           </p:cNvSpPr>
           <p:nvPr>
-            <p:ph type="dt" idx="1"/>
+            <p:ph type="ftr" idx="1"/>
+          </p:nvPr>
+        </p:nvSpPr>
+        <p:spPr>
+          <a:xfrm>
+            <a:off x="3447360" y="5165280"/>
+            <a:ext cx="3194280" cy="389880"/>
+          </a:xfrm>
+          <a:prstGeom prst="rect">
+            <a:avLst/>
+          </a:prstGeom>
+          <a:noFill/>
+          <a:ln w="0">
+            <a:noFill/>
+          </a:ln>
+        </p:spPr>
+        <p:txBody>
+          <a:bodyPr lIns="0" rIns="0" tIns="0" bIns="0" anchor="t">
+            <a:noAutofit/>
+          </a:bodyPr>
+          <a:lstStyle>
+            <a:lvl1pPr indent="0" algn="ctr">
+              <a:lnSpc>
+                <a:spcPct val="100000"/>
+              </a:lnSpc>
+              <a:buNone/>
+              <a:tabLst>
+                <a:tab algn="l" pos="0"/>
+              </a:tabLst>
+              <a:defRPr b="0" lang="en-US" sz="1400" strike="noStrike" u="none">
+                <a:solidFill>
+                  <a:srgbClr val="000000"/>
+                </a:solidFill>
+                <a:uFillTx/>
+                <a:latin typeface="Times New Roman"/>
+              </a:defRPr>
+            </a:lvl1pPr>
+          </a:lstStyle>
+          <a:p>
+            <a:pPr indent="0" algn="ctr">
+              <a:lnSpc>
+                <a:spcPct val="100000"/>
+              </a:lnSpc>
+              <a:buNone/>
+              <a:tabLst>
+                <a:tab algn="l" pos="0"/>
+              </a:tabLst>
+            </a:pPr>
+            <a:r>
+              <a:rPr b="0" lang="en-US" sz="1400" strike="noStrike" u="none">
+                <a:solidFill>
+                  <a:srgbClr val="000000"/>
+                </a:solidFill>
+                <a:uFillTx/>
+                <a:latin typeface="Times New Roman"/>
+              </a:rPr>
+              <a:t>&lt;footer&gt;</a:t>
+            </a:r>
+            <a:endParaRPr b="0" lang="en-US" sz="1400" strike="noStrike" u="none">
+              <a:solidFill>
+                <a:srgbClr val="000000"/>
+              </a:solidFill>
+              <a:uFillTx/>
+              <a:latin typeface="Times New Roman"/>
+            </a:endParaRPr>
+          </a:p>
+        </p:txBody>
+      </p:sp>
+      <p:sp>
+        <p:nvSpPr>
+          <p:cNvPr id="3" name="PlaceHolder 4"/>
+          <p:cNvSpPr>
+            <a:spLocks noGrp="1"/>
+          </p:cNvSpPr>
+          <p:nvPr>
+            <p:ph type="sldNum" idx="2"/>
+          </p:nvPr>
+        </p:nvSpPr>
+        <p:spPr>
+          <a:xfrm>
+            <a:off x="7227360" y="5165280"/>
+            <a:ext cx="2347560" cy="389880"/>
+          </a:xfrm>
+          <a:prstGeom prst="rect">
+            <a:avLst/>
+          </a:prstGeom>
+          <a:noFill/>
+          <a:ln w="0">
+            <a:noFill/>
+          </a:ln>
+        </p:spPr>
+        <p:txBody>
+          <a:bodyPr lIns="0" rIns="0" tIns="0" bIns="0" anchor="t">
+            <a:noAutofit/>
+          </a:bodyPr>
+          <a:lstStyle>
+            <a:lvl1pPr indent="0" algn="r">
+              <a:lnSpc>
+                <a:spcPct val="100000"/>
+              </a:lnSpc>
+              <a:buNone/>
+              <a:tabLst>
+                <a:tab algn="l" pos="0"/>
+              </a:tabLst>
+              <a:defRPr b="0" lang="en-US" sz="1400" strike="noStrike" u="none">
+                <a:solidFill>
+                  <a:srgbClr val="000000"/>
+                </a:solidFill>
+                <a:uFillTx/>
+                <a:latin typeface="Times New Roman"/>
+              </a:defRPr>
+            </a:lvl1pPr>
+          </a:lstStyle>
+          <a:p>
+            <a:pPr indent="0" algn="r">
+              <a:lnSpc>
+                <a:spcPct val="100000"/>
+              </a:lnSpc>
+              <a:buNone/>
+              <a:tabLst>
+                <a:tab algn="l" pos="0"/>
+              </a:tabLst>
+            </a:pPr>
+            <a:fld id="{6561283B-12A8-4FAB-9591-604866EEF73F}" type="slidenum">
+              <a:rPr b="0" lang="en-US" sz="1400" strike="noStrike" u="none">
+                <a:solidFill>
+                  <a:srgbClr val="000000"/>
+                </a:solidFill>
+                <a:uFillTx/>
+                <a:latin typeface="Times New Roman"/>
+              </a:rPr>
+              <a:t>&lt;number&gt;</a:t>
+            </a:fld>
+            <a:endParaRPr b="0" lang="en-US" sz="1400" strike="noStrike" u="none">
+              <a:solidFill>
+                <a:srgbClr val="000000"/>
+              </a:solidFill>
+              <a:uFillTx/>
+              <a:latin typeface="Times New Roman"/>
+            </a:endParaRPr>
+          </a:p>
+        </p:txBody>
+      </p:sp>
+      <p:sp>
+        <p:nvSpPr>
+          <p:cNvPr id="4" name="PlaceHolder 5"/>
+          <p:cNvSpPr>
+            <a:spLocks noGrp="1"/>
+          </p:cNvSpPr>
+          <p:nvPr>
+            <p:ph type="dt" idx="3"/>
           </p:nvPr>
         </p:nvSpPr>
         <p:spPr>
           <a:xfrm>
             <a:off x="504000" y="5165280"/>
-            <a:ext cx="2348280" cy="390600"/>
+            <a:ext cx="2347560" cy="389880"/>
           </a:xfrm>
           <a:prstGeom prst="rect">
             <a:avLst/>
@@ -718,20 +869,97 @@
           </a:p>
         </p:txBody>
       </p:sp>
+    </p:spTree>
+  </p:cSld>
+  <p:clrMap bg1="lt1" tx1="dk1" bg2="lt2" tx2="dk2" accent1="accent1" accent2="accent2" accent3="accent3" accent4="accent4" accent5="accent5" accent6="accent6" hlink="hlink" folHlink="folHlink"/>
+  <p:sldLayoutIdLst>
+    <p:sldLayoutId id="2147483649" r:id="rId2"/>
+  </p:sldLayoutIdLst>
+</p:sldMaster>
+</file>
+
+<file path=ppt/slideMasters/slideMaster2.xml><?xml version="1.0" encoding="utf-8"?>
+<p:sldMaster xmlns:a="http://schemas.openxmlformats.org/drawingml/2006/main" xmlns:p="http://schemas.openxmlformats.org/presentationml/2006/main" xmlns:r="http://schemas.openxmlformats.org/officeDocument/2006/relationships" xmlns:p14="http://schemas.microsoft.com/office/powerpoint/2010/main" xmlns:p15="http://schemas.microsoft.com/office/powerpoint/2012/main" xmlns:mc="http://schemas.openxmlformats.org/markup-compatibility/2006">
+  <p:cSld>
+    <p:spTree>
+      <p:nvGrpSpPr>
+        <p:cNvPr id="1" name=""/>
+        <p:cNvGrpSpPr/>
+        <p:nvPr/>
+      </p:nvGrpSpPr>
+      <p:grpSpPr>
+        <a:xfrm>
+          <a:off x="0" y="0"/>
+          <a:ext cx="0" cy="0"/>
+          <a:chOff x="0" y="0"/>
+          <a:chExt cx="0" cy="0"/>
+        </a:xfrm>
+      </p:grpSpPr>
       <p:sp>
         <p:nvSpPr>
-          <p:cNvPr id="3" name="PlaceHolder 4"/>
+          <p:cNvPr id="7" name="PlaceHolder 1"/>
           <p:cNvSpPr>
             <a:spLocks noGrp="1"/>
           </p:cNvSpPr>
           <p:nvPr>
-            <p:ph type="ftr" idx="2"/>
+            <p:ph type="title"/>
+          </p:nvPr>
+        </p:nvSpPr>
+        <p:spPr>
+          <a:xfrm>
+            <a:off x="504000" y="226080"/>
+            <a:ext cx="9070920" cy="945720"/>
+          </a:xfrm>
+          <a:prstGeom prst="rect">
+            <a:avLst/>
+          </a:prstGeom>
+          <a:noFill/>
+          <a:ln w="0">
+            <a:noFill/>
+          </a:ln>
+        </p:spPr>
+        <p:txBody>
+          <a:bodyPr lIns="0" rIns="0" tIns="0" bIns="0" anchor="ctr">
+            <a:noAutofit/>
+          </a:bodyPr>
+          <a:p>
+            <a:pPr indent="0">
+              <a:buNone/>
+            </a:pPr>
+            <a:r>
+              <a:rPr b="0" lang="en-US" sz="1800" strike="noStrike" u="none">
+                <a:solidFill>
+                  <a:srgbClr val="000000"/>
+                </a:solidFill>
+                <a:uFillTx/>
+                <a:latin typeface="Arial"/>
+              </a:rPr>
+              <a:t>Click to edit the title text format</a:t>
+            </a:r>
+            <a:endParaRPr b="0" lang="en-US" sz="1800" strike="noStrike" u="none">
+              <a:solidFill>
+                <a:srgbClr val="000000"/>
+              </a:solidFill>
+              <a:uFillTx/>
+              <a:latin typeface="Arial"/>
+            </a:endParaRPr>
+          </a:p>
+        </p:txBody>
+      </p:sp>
+      <p:sp>
+        <p:nvSpPr>
+          <p:cNvPr id="8" name="PlaceHolder 2"/>
+          <p:cNvSpPr>
+            <a:spLocks noGrp="1"/>
+          </p:cNvSpPr>
+          <p:nvPr>
+            <p:ph type="ftr" idx="4"/>
           </p:nvPr>
         </p:nvSpPr>
         <p:spPr>
           <a:xfrm>
             <a:off x="3447360" y="5165280"/>
-            <a:ext cx="3195000" cy="390600"/>
+            <a:ext cx="3194280" cy="389880"/>
           </a:xfrm>
           <a:prstGeom prst="rect">
             <a:avLst/>
@@ -747,7 +975,13 @@
           </a:bodyPr>
           <a:lstStyle>
             <a:lvl1pPr indent="0" algn="ctr">
+              <a:lnSpc>
+                <a:spcPct val="100000"/>
+              </a:lnSpc>
               <a:buNone/>
+              <a:tabLst>
+                <a:tab algn="l" pos="0"/>
+              </a:tabLst>
               <a:defRPr b="0" lang="en-US" sz="1400" strike="noStrike" u="none">
                 <a:solidFill>
                   <a:srgbClr val="000000"/>
@@ -759,7 +993,13 @@
           </a:lstStyle>
           <a:p>
             <a:pPr indent="0" algn="ctr">
+              <a:lnSpc>
+                <a:spcPct val="100000"/>
+              </a:lnSpc>
               <a:buNone/>
+              <a:tabLst>
+                <a:tab algn="l" pos="0"/>
+              </a:tabLst>
             </a:pPr>
             <a:r>
               <a:rPr b="0" lang="en-US" sz="1400" strike="noStrike" u="none">
@@ -783,18 +1023,18 @@
       </p:sp>
       <p:sp>
         <p:nvSpPr>
-          <p:cNvPr id="4" name="PlaceHolder 5"/>
+          <p:cNvPr id="9" name="PlaceHolder 3"/>
           <p:cNvSpPr>
             <a:spLocks noGrp="1"/>
           </p:cNvSpPr>
           <p:nvPr>
-            <p:ph type="sldNum" idx="3"/>
+            <p:ph type="sldNum" idx="5"/>
           </p:nvPr>
         </p:nvSpPr>
         <p:spPr>
           <a:xfrm>
             <a:off x="7227360" y="5165280"/>
-            <a:ext cx="2348280" cy="390600"/>
+            <a:ext cx="2347560" cy="389880"/>
           </a:xfrm>
           <a:prstGeom prst="rect">
             <a:avLst/>
@@ -810,7 +1050,13 @@
           </a:bodyPr>
           <a:lstStyle>
             <a:lvl1pPr indent="0" algn="r">
+              <a:lnSpc>
+                <a:spcPct val="100000"/>
+              </a:lnSpc>
               <a:buNone/>
+              <a:tabLst>
+                <a:tab algn="l" pos="0"/>
+              </a:tabLst>
               <a:defRPr b="0" lang="en-US" sz="1400" strike="noStrike" u="none">
                 <a:solidFill>
                   <a:srgbClr val="000000"/>
@@ -822,9 +1068,15 @@
           </a:lstStyle>
           <a:p>
             <a:pPr indent="0" algn="r">
+              <a:lnSpc>
+                <a:spcPct val="100000"/>
+              </a:lnSpc>
               <a:buNone/>
-            </a:pPr>
-            <a:fld id="{C15CC66F-BA96-4C3E-BF70-189647ACACE9}" type="slidenum">
+              <a:tabLst>
+                <a:tab algn="l" pos="0"/>
+              </a:tabLst>
+            </a:pPr>
+            <a:fld id="{DF862227-8EF2-48BC-9496-3FBD37961454}" type="slidenum">
               <a:rPr b="0" lang="en-US" sz="1400" strike="noStrike" u="none">
                 <a:solidFill>
                   <a:srgbClr val="000000"/>
@@ -840,6 +1092,308 @@
               </a:solidFill>
               <a:uFillTx/>
               <a:latin typeface="Times New Roman"/>
+            </a:endParaRPr>
+          </a:p>
+        </p:txBody>
+      </p:sp>
+      <p:sp>
+        <p:nvSpPr>
+          <p:cNvPr id="10" name="PlaceHolder 4"/>
+          <p:cNvSpPr>
+            <a:spLocks noGrp="1"/>
+          </p:cNvSpPr>
+          <p:nvPr>
+            <p:ph type="dt" idx="6"/>
+          </p:nvPr>
+        </p:nvSpPr>
+        <p:spPr>
+          <a:xfrm>
+            <a:off x="504000" y="5165280"/>
+            <a:ext cx="2347560" cy="389880"/>
+          </a:xfrm>
+          <a:prstGeom prst="rect">
+            <a:avLst/>
+          </a:prstGeom>
+          <a:noFill/>
+          <a:ln w="0">
+            <a:noFill/>
+          </a:ln>
+        </p:spPr>
+        <p:txBody>
+          <a:bodyPr lIns="0" rIns="0" tIns="0" bIns="0" anchor="t">
+            <a:noAutofit/>
+          </a:bodyPr>
+          <a:lstStyle>
+            <a:lvl1pPr indent="0">
+              <a:buNone/>
+              <a:defRPr b="0" lang="en-US" sz="1400" strike="noStrike" u="none">
+                <a:solidFill>
+                  <a:srgbClr val="000000"/>
+                </a:solidFill>
+                <a:uFillTx/>
+                <a:latin typeface="Times New Roman"/>
+              </a:defRPr>
+            </a:lvl1pPr>
+          </a:lstStyle>
+          <a:p>
+            <a:pPr indent="0">
+              <a:buNone/>
+            </a:pPr>
+            <a:r>
+              <a:rPr b="0" lang="en-US" sz="1400" strike="noStrike" u="none">
+                <a:solidFill>
+                  <a:srgbClr val="000000"/>
+                </a:solidFill>
+                <a:uFillTx/>
+                <a:latin typeface="Times New Roman"/>
+              </a:rPr>
+              <a:t>&lt;date/time&gt;</a:t>
+            </a:r>
+            <a:endParaRPr b="0" lang="en-US" sz="1400" strike="noStrike" u="none">
+              <a:solidFill>
+                <a:srgbClr val="000000"/>
+              </a:solidFill>
+              <a:uFillTx/>
+              <a:latin typeface="Times New Roman"/>
+            </a:endParaRPr>
+          </a:p>
+        </p:txBody>
+      </p:sp>
+      <p:sp>
+        <p:nvSpPr>
+          <p:cNvPr id="11" name="PlaceHolder 5"/>
+          <p:cNvSpPr>
+            <a:spLocks noGrp="1"/>
+          </p:cNvSpPr>
+          <p:nvPr>
+            <p:ph type="body"/>
+          </p:nvPr>
+        </p:nvSpPr>
+        <p:spPr>
+          <a:xfrm>
+            <a:off x="504000" y="1326600"/>
+            <a:ext cx="9072000" cy="3288600"/>
+          </a:xfrm>
+          <a:prstGeom prst="rect">
+            <a:avLst/>
+          </a:prstGeom>
+          <a:noFill/>
+          <a:ln w="0">
+            <a:noFill/>
+          </a:ln>
+        </p:spPr>
+        <p:txBody>
+          <a:bodyPr lIns="0" rIns="0" tIns="0" bIns="0" anchor="t">
+            <a:normAutofit/>
+          </a:bodyPr>
+          <a:p>
+            <a:pPr marL="432000" indent="-324000">
+              <a:spcBef>
+                <a:spcPts val="1417"/>
+              </a:spcBef>
+              <a:buClr>
+                <a:srgbClr val="000000"/>
+              </a:buClr>
+              <a:buSzPct val="45000"/>
+              <a:buFont typeface="Wingdings" charset="2"/>
+              <a:buChar char=""/>
+            </a:pPr>
+            <a:r>
+              <a:rPr b="0" lang="en-US" sz="3200" strike="noStrike" u="none">
+                <a:solidFill>
+                  <a:srgbClr val="000000"/>
+                </a:solidFill>
+                <a:uFillTx/>
+                <a:latin typeface="Arial"/>
+              </a:rPr>
+              <a:t>Click to edit the outline text format</a:t>
+            </a:r>
+            <a:endParaRPr b="0" lang="en-US" sz="3200" strike="noStrike" u="none">
+              <a:solidFill>
+                <a:srgbClr val="000000"/>
+              </a:solidFill>
+              <a:uFillTx/>
+              <a:latin typeface="Arial"/>
+            </a:endParaRPr>
+          </a:p>
+          <a:p>
+            <a:pPr lvl="1" marL="864000" indent="-324000">
+              <a:spcBef>
+                <a:spcPts val="1134"/>
+              </a:spcBef>
+              <a:buClr>
+                <a:srgbClr val="000000"/>
+              </a:buClr>
+              <a:buSzPct val="75000"/>
+              <a:buFont typeface="Symbol" charset="2"/>
+              <a:buChar char=""/>
+            </a:pPr>
+            <a:r>
+              <a:rPr b="0" lang="en-US" sz="2800" strike="noStrike" u="none">
+                <a:solidFill>
+                  <a:srgbClr val="000000"/>
+                </a:solidFill>
+                <a:uFillTx/>
+                <a:latin typeface="Arial"/>
+              </a:rPr>
+              <a:t>Second Outline Level</a:t>
+            </a:r>
+            <a:endParaRPr b="0" lang="en-US" sz="2800" strike="noStrike" u="none">
+              <a:solidFill>
+                <a:srgbClr val="000000"/>
+              </a:solidFill>
+              <a:uFillTx/>
+              <a:latin typeface="Arial"/>
+            </a:endParaRPr>
+          </a:p>
+          <a:p>
+            <a:pPr lvl="2" marL="1296000" indent="-288000">
+              <a:spcBef>
+                <a:spcPts val="850"/>
+              </a:spcBef>
+              <a:buClr>
+                <a:srgbClr val="000000"/>
+              </a:buClr>
+              <a:buSzPct val="45000"/>
+              <a:buFont typeface="Wingdings" charset="2"/>
+              <a:buChar char=""/>
+            </a:pPr>
+            <a:r>
+              <a:rPr b="0" lang="en-US" sz="2400" strike="noStrike" u="none">
+                <a:solidFill>
+                  <a:srgbClr val="000000"/>
+                </a:solidFill>
+                <a:uFillTx/>
+                <a:latin typeface="Arial"/>
+              </a:rPr>
+              <a:t>Third Outline Level</a:t>
+            </a:r>
+            <a:endParaRPr b="0" lang="en-US" sz="2400" strike="noStrike" u="none">
+              <a:solidFill>
+                <a:srgbClr val="000000"/>
+              </a:solidFill>
+              <a:uFillTx/>
+              <a:latin typeface="Arial"/>
+            </a:endParaRPr>
+          </a:p>
+          <a:p>
+            <a:pPr lvl="3" marL="1728000" indent="-216000">
+              <a:spcBef>
+                <a:spcPts val="567"/>
+              </a:spcBef>
+              <a:buClr>
+                <a:srgbClr val="000000"/>
+              </a:buClr>
+              <a:buSzPct val="75000"/>
+              <a:buFont typeface="Symbol" charset="2"/>
+              <a:buChar char=""/>
+            </a:pPr>
+            <a:r>
+              <a:rPr b="0" lang="en-US" sz="2000" strike="noStrike" u="none">
+                <a:solidFill>
+                  <a:srgbClr val="000000"/>
+                </a:solidFill>
+                <a:uFillTx/>
+                <a:latin typeface="Arial"/>
+              </a:rPr>
+              <a:t>Fourth Outline Level</a:t>
+            </a:r>
+            <a:endParaRPr b="0" lang="en-US" sz="2000" strike="noStrike" u="none">
+              <a:solidFill>
+                <a:srgbClr val="000000"/>
+              </a:solidFill>
+              <a:uFillTx/>
+              <a:latin typeface="Arial"/>
+            </a:endParaRPr>
+          </a:p>
+          <a:p>
+            <a:pPr lvl="4" marL="2160000" indent="-216000">
+              <a:spcBef>
+                <a:spcPts val="283"/>
+              </a:spcBef>
+              <a:buClr>
+                <a:srgbClr val="000000"/>
+              </a:buClr>
+              <a:buSzPct val="45000"/>
+              <a:buFont typeface="Wingdings" charset="2"/>
+              <a:buChar char=""/>
+            </a:pPr>
+            <a:r>
+              <a:rPr b="0" lang="en-US" sz="2000" strike="noStrike" u="none">
+                <a:solidFill>
+                  <a:srgbClr val="000000"/>
+                </a:solidFill>
+                <a:uFillTx/>
+                <a:latin typeface="Arial"/>
+              </a:rPr>
+              <a:t>Fifth Outline Level</a:t>
+            </a:r>
+            <a:endParaRPr b="0" lang="en-US" sz="2000" strike="noStrike" u="none">
+              <a:solidFill>
+                <a:srgbClr val="000000"/>
+              </a:solidFill>
+              <a:uFillTx/>
+              <a:latin typeface="Arial"/>
+            </a:endParaRPr>
+          </a:p>
+          <a:p>
+            <a:pPr lvl="5" marL="2592000" indent="-216000">
+              <a:spcBef>
+                <a:spcPts val="283"/>
+              </a:spcBef>
+              <a:buClr>
+                <a:srgbClr val="000000"/>
+              </a:buClr>
+              <a:buSzPct val="45000"/>
+              <a:buFont typeface="Wingdings" charset="2"/>
+              <a:buChar char=""/>
+            </a:pPr>
+            <a:r>
+              <a:rPr b="0" lang="en-US" sz="2000" strike="noStrike" u="none">
+                <a:solidFill>
+                  <a:srgbClr val="000000"/>
+                </a:solidFill>
+                <a:uFillTx/>
+                <a:latin typeface="Arial"/>
+              </a:rPr>
+              <a:t>Sixth Outline Level</a:t>
+            </a:r>
+            <a:endParaRPr b="0" lang="en-US" sz="2000" strike="noStrike" u="none">
+              <a:solidFill>
+                <a:srgbClr val="000000"/>
+              </a:solidFill>
+              <a:uFillTx/>
+              <a:latin typeface="Arial"/>
+            </a:endParaRPr>
+          </a:p>
+          <a:p>
+            <a:pPr lvl="6" marL="3024000" indent="-216000">
+              <a:spcBef>
+                <a:spcPts val="283"/>
+              </a:spcBef>
+              <a:buClr>
+                <a:srgbClr val="000000"/>
+              </a:buClr>
+              <a:buSzPct val="45000"/>
+              <a:buFont typeface="Wingdings" charset="2"/>
+              <a:buChar char=""/>
+            </a:pPr>
+            <a:r>
+              <a:rPr b="0" lang="en-US" sz="2000" strike="noStrike" u="none">
+                <a:solidFill>
+                  <a:srgbClr val="000000"/>
+                </a:solidFill>
+                <a:uFillTx/>
+                <a:latin typeface="Arial"/>
+              </a:rPr>
+              <a:t>Seventh Outline Level</a:t>
+            </a:r>
+            <a:endParaRPr b="0" lang="en-US" sz="2000" strike="noStrike" u="none">
+              <a:solidFill>
+                <a:srgbClr val="000000"/>
+              </a:solidFill>
+              <a:uFillTx/>
+              <a:latin typeface="Arial"/>
             </a:endParaRPr>
           </a:p>
         </p:txBody>
@@ -848,8 +1402,7 @@
   </p:cSld>
   <p:clrMap bg1="lt1" tx1="dk1" bg2="lt2" tx2="dk2" accent1="accent1" accent2="accent2" accent3="accent3" accent4="accent4" accent5="accent5" accent6="accent6" hlink="hlink" folHlink="folHlink"/>
   <p:sldLayoutIdLst>
-    <p:sldLayoutId id="2147483649" r:id="rId2"/>
-    <p:sldLayoutId id="2147483650" r:id="rId3"/>
+    <p:sldLayoutId id="2147483651" r:id="rId2"/>
   </p:sldLayoutIdLst>
 </p:sldMaster>
 </file>
@@ -880,7 +1433,7 @@
       </p:grpSpPr>
       <p:pic>
         <p:nvPicPr>
-          <p:cNvPr id="9" name="" descr=""/>
+          <p:cNvPr id="14" name="" descr=""/>
           <p:cNvPicPr/>
           <p:nvPr/>
         </p:nvPicPr>
@@ -891,7 +1444,7 @@
         <p:spPr>
           <a:xfrm>
             <a:off x="8458200" y="3886200"/>
-            <a:ext cx="1371600" cy="1371600"/>
+            <a:ext cx="1370880" cy="1370880"/>
           </a:xfrm>
           <a:prstGeom prst="rect">
             <a:avLst/>
@@ -903,7 +1456,7 @@
       </p:pic>
       <p:sp>
         <p:nvSpPr>
-          <p:cNvPr id="10" name="PlaceHolder 1"/>
+          <p:cNvPr id="15" name="PlaceHolder 1"/>
           <p:cNvSpPr>
             <a:spLocks noGrp="1"/>
           </p:cNvSpPr>
@@ -914,7 +1467,7 @@
         <p:spPr>
           <a:xfrm>
             <a:off x="0" y="74160"/>
-            <a:ext cx="10058400" cy="1250280"/>
+            <a:ext cx="10057680" cy="1249560"/>
           </a:xfrm>
           <a:prstGeom prst="rect">
             <a:avLst/>
@@ -930,7 +1483,13 @@
           </a:bodyPr>
           <a:p>
             <a:pPr indent="0" algn="ctr">
+              <a:lnSpc>
+                <a:spcPct val="100000"/>
+              </a:lnSpc>
               <a:buNone/>
+              <a:tabLst>
+                <a:tab algn="l" pos="0"/>
+              </a:tabLst>
             </a:pPr>
             <a:r>
               <a:rPr b="1" lang="en-US" sz="3100" strike="noStrike" u="none">
@@ -942,7 +1501,7 @@
               </a:rPr>
               <a:t>Gordy’s Novelties Store Application</a:t>
             </a:r>
-            <a:endParaRPr b="1" lang="en-US" sz="3100" strike="noStrike" u="none">
+            <a:endParaRPr b="0" lang="en-US" sz="3100" strike="noStrike" u="none">
               <a:solidFill>
                 <a:srgbClr val="000000"/>
               </a:solidFill>
@@ -954,7 +1513,7 @@
       </p:sp>
       <p:sp>
         <p:nvSpPr>
-          <p:cNvPr id="11" name="PlaceHolder 2"/>
+          <p:cNvPr id="16" name="PlaceHolder 2"/>
           <p:cNvSpPr>
             <a:spLocks noGrp="1"/>
           </p:cNvSpPr>
@@ -965,7 +1524,7 @@
         <p:spPr>
           <a:xfrm>
             <a:off x="228600" y="1143000"/>
-            <a:ext cx="4525200" cy="2786040"/>
+            <a:ext cx="4524480" cy="2785320"/>
           </a:xfrm>
           <a:prstGeom prst="rect">
             <a:avLst/>
@@ -981,6 +1540,9 @@
           </a:bodyPr>
           <a:p>
             <a:pPr indent="0">
+              <a:lnSpc>
+                <a:spcPct val="100000"/>
+              </a:lnSpc>
               <a:spcBef>
                 <a:spcPts val="1191"/>
               </a:spcBef>
@@ -988,6 +1550,9 @@
                 <a:spcPts val="992"/>
               </a:spcAft>
               <a:buNone/>
+              <a:tabLst>
+                <a:tab algn="l" pos="0"/>
+              </a:tabLst>
             </a:pPr>
             <a:r>
               <a:rPr b="1" lang="en-US" sz="3200" strike="noStrike" u="none">
@@ -999,7 +1564,7 @@
               </a:rPr>
               <a:t>Project 1:</a:t>
             </a:r>
-            <a:endParaRPr b="1" lang="en-US" sz="3200" strike="noStrike" u="none">
+            <a:endParaRPr b="0" lang="en-US" sz="3200" strike="noStrike" u="none">
               <a:solidFill>
                 <a:srgbClr val="000000"/>
               </a:solidFill>
@@ -1009,6 +1574,9 @@
           </a:p>
           <a:p>
             <a:pPr indent="0">
+              <a:lnSpc>
+                <a:spcPct val="100000"/>
+              </a:lnSpc>
               <a:spcBef>
                 <a:spcPts val="1191"/>
               </a:spcBef>
@@ -1016,6 +1584,9 @@
                 <a:spcPts val="992"/>
               </a:spcAft>
               <a:buNone/>
+              <a:tabLst>
+                <a:tab algn="l" pos="0"/>
+              </a:tabLst>
             </a:pPr>
             <a:r>
               <a:rPr b="1" lang="en-US" sz="3200" strike="noStrike" u="none">
@@ -1027,7 +1598,7 @@
               </a:rPr>
               <a:t>By Kenny Muriel</a:t>
             </a:r>
-            <a:endParaRPr b="1" lang="en-US" sz="3200" strike="noStrike" u="none">
+            <a:endParaRPr b="0" lang="en-US" sz="3200" strike="noStrike" u="none">
               <a:solidFill>
                 <a:srgbClr val="000000"/>
               </a:solidFill>
@@ -1039,7 +1610,7 @@
       </p:sp>
       <p:pic>
         <p:nvPicPr>
-          <p:cNvPr id="12" name="" descr=""/>
+          <p:cNvPr id="17" name="" descr=""/>
           <p:cNvPicPr/>
           <p:nvPr/>
         </p:nvPicPr>
@@ -1050,7 +1621,7 @@
         <p:spPr>
           <a:xfrm>
             <a:off x="5943600" y="1600560"/>
-            <a:ext cx="2743200" cy="3332520"/>
+            <a:ext cx="2742480" cy="3331800"/>
           </a:xfrm>
           <a:prstGeom prst="rect">
             <a:avLst/>
@@ -1060,35 +1631,6 @@
           </a:ln>
         </p:spPr>
       </p:pic>
-      <mc:AlternateContent>
-        <mc:Choice xmlns:a14="http://schemas.microsoft.com/office/drawing/2010/main" Requires="a14">
-          <p:sp>
-            <p:nvSpPr>
-              <p:cNvPr id="13" name=""/>
-              <p:cNvSpPr txBox="1"/>
-              <p:nvPr/>
-            </p:nvSpPr>
-            <p:spPr>
-              <a:xfrm>
-                <a:off x="4427280" y="2757600"/>
-                <a:ext cx="1269720" cy="634680"/>
-              </a:xfrm>
-              <a:prstGeom prst="rect">
-                <a:avLst/>
-              </a:prstGeom>
-            </p:spPr>
-            <p:txBody>
-              <a:bodyPr/>
-              <a:p>
-                <a14:m>
-                  <m:oMath xmlns:m="http://schemas.openxmlformats.org/officeDocument/2006/math"/>
-                </a14:m>
-              </a:p>
-            </p:txBody>
-          </p:sp>
-        </mc:Choice>
-        <mc:Fallback/>
-      </mc:AlternateContent>
     </p:spTree>
   </p:cSld>
   <mc:AlternateContent>
@@ -1127,13 +1669,13 @@
                                   <p:childTnLst>
                                     <p:set>
                                       <p:cBhvr>
-                                        <p:cTn id="6" dur="0" fill="hold">
+                                        <p:cTn id="6" fill="hold">
                                           <p:stCondLst>
                                             <p:cond delay="0"/>
                                           </p:stCondLst>
                                         </p:cTn>
                                         <p:tgtEl>
-                                          <p:spTgt spid="10">
+                                          <p:spTgt spid="15">
                                             <p:txEl>
                                               <p:pRg st="0" end="0"/>
                                             </p:txEl>
@@ -1151,7 +1693,7 @@
                                       <p:cBhvr additive="repl">
                                         <p:cTn id="7" dur="250"/>
                                         <p:tgtEl>
-                                          <p:spTgt spid="10">
+                                          <p:spTgt spid="15">
                                             <p:txEl>
                                               <p:pRg st="0" end="0"/>
                                             </p:txEl>
@@ -1188,13 +1730,13 @@
                                   <p:childTnLst>
                                     <p:set>
                                       <p:cBhvr>
-                                        <p:cTn id="11" dur="0" fill="hold">
+                                        <p:cTn id="11" fill="hold">
                                           <p:stCondLst>
                                             <p:cond delay="0"/>
                                           </p:stCondLst>
                                         </p:cTn>
                                         <p:tgtEl>
-                                          <p:spTgt spid="11">
+                                          <p:spTgt spid="16">
                                             <p:txEl>
                                               <p:pRg st="0" end="0"/>
                                             </p:txEl>
@@ -1212,7 +1754,7 @@
                                       <p:cBhvr additive="repl">
                                         <p:cTn id="12" dur="125" fill="hold"/>
                                         <p:tgtEl>
-                                          <p:spTgt spid="11">
+                                          <p:spTgt spid="16">
                                             <p:txEl>
                                               <p:pRg st="0" end="0"/>
                                             </p:txEl>
@@ -1239,7 +1781,7 @@
                                       <p:cBhvr additive="repl">
                                         <p:cTn id="13" dur="125" fill="hold"/>
                                         <p:tgtEl>
-                                          <p:spTgt spid="11">
+                                          <p:spTgt spid="16">
                                             <p:txEl>
                                               <p:pRg st="0" end="0"/>
                                             </p:txEl>
@@ -1291,13 +1833,13 @@
                                   <p:childTnLst>
                                     <p:set>
                                       <p:cBhvr>
-                                        <p:cTn id="17" dur="0" fill="hold">
+                                        <p:cTn id="17" fill="hold">
                                           <p:stCondLst>
                                             <p:cond delay="0"/>
                                           </p:stCondLst>
                                         </p:cTn>
                                         <p:tgtEl>
-                                          <p:spTgt spid="11">
+                                          <p:spTgt spid="16">
                                             <p:txEl>
                                               <p:pRg st="1" end="1"/>
                                             </p:txEl>
@@ -1315,7 +1857,7 @@
                                       <p:cBhvr additive="repl">
                                         <p:cTn id="18" dur="125" fill="hold"/>
                                         <p:tgtEl>
-                                          <p:spTgt spid="11">
+                                          <p:spTgt spid="16">
                                             <p:txEl>
                                               <p:pRg st="1" end="1"/>
                                             </p:txEl>
@@ -1342,7 +1884,7 @@
                                       <p:cBhvr additive="repl">
                                         <p:cTn id="19" dur="125" fill="hold"/>
                                         <p:tgtEl>
-                                          <p:spTgt spid="11">
+                                          <p:spTgt spid="16">
                                             <p:txEl>
                                               <p:pRg st="1" end="1"/>
                                             </p:txEl>
@@ -1400,7 +1942,7 @@
                                           </p:stCondLst>
                                         </p:cTn>
                                         <p:tgtEl>
-                                          <p:spTgt spid="12"/>
+                                          <p:spTgt spid="17"/>
                                         </p:tgtEl>
                                         <p:attrNameLst>
                                           <p:attrName>style.visibility</p:attrName>
@@ -1414,7 +1956,7 @@
                                       <p:cBhvr additive="repl">
                                         <p:cTn id="24" dur="1000" fill="hold"/>
                                         <p:tgtEl>
-                                          <p:spTgt spid="12"/>
+                                          <p:spTgt spid="17"/>
                                         </p:tgtEl>
                                         <p:attrNameLst>
                                           <p:attrName>ppt_w</p:attrName>
@@ -1437,7 +1979,7 @@
                                       <p:cBhvr additive="repl">
                                         <p:cTn id="25" dur="1000" fill="hold"/>
                                         <p:tgtEl>
-                                          <p:spTgt spid="12"/>
+                                          <p:spTgt spid="17"/>
                                         </p:tgtEl>
                                         <p:attrNameLst>
                                           <p:attrName>ppt_h</p:attrName>
@@ -1460,7 +2002,7 @@
                                       <p:cBhvr additive="repl">
                                         <p:cTn id="26" dur="1000" fill="hold"/>
                                         <p:tgtEl>
-                                          <p:spTgt spid="12"/>
+                                          <p:spTgt spid="17"/>
                                         </p:tgtEl>
                                         <p:attrNameLst>
                                           <p:attrName>ppt_x</p:attrName>
@@ -1483,7 +2025,7 @@
                                       <p:cBhvr additive="repl">
                                         <p:cTn id="27" dur="1000" fill="hold"/>
                                         <p:tgtEl>
-                                          <p:spTgt spid="12"/>
+                                          <p:spTgt spid="17"/>
                                         </p:tgtEl>
                                         <p:attrNameLst>
                                           <p:attrName>ppt_y</p:attrName>
@@ -1537,7 +2079,7 @@
                                           </p:stCondLst>
                                         </p:cTn>
                                         <p:tgtEl>
-                                          <p:spTgt spid="9"/>
+                                          <p:spTgt spid="14"/>
                                         </p:tgtEl>
                                         <p:attrNameLst>
                                           <p:attrName>style.visibility</p:attrName>
@@ -1551,7 +2093,7 @@
                                       <p:cBhvr additive="repl">
                                         <p:cTn id="32" dur="-1000" fill="hold"/>
                                         <p:tgtEl>
-                                          <p:spTgt spid="9"/>
+                                          <p:spTgt spid="14"/>
                                         </p:tgtEl>
                                         <p:attrNameLst>
                                           <p:attrName>ppt_w</p:attrName>
@@ -1574,7 +2116,7 @@
                                       <p:cBhvr additive="repl">
                                         <p:cTn id="33" dur="-1000" fill="hold"/>
                                         <p:tgtEl>
-                                          <p:spTgt spid="9"/>
+                                          <p:spTgt spid="14"/>
                                         </p:tgtEl>
                                         <p:attrNameLst>
                                           <p:attrName>ppt_h</p:attrName>
@@ -1606,20 +2148,20 @@
                             </p:stCondLst>
                             <p:childTnLst>
                               <p:par>
-                                <p:cTn id="35" nodeType="afterEffect" fill="hold" presetClass="mediacall" presetID="0">
+                                <p:cTn id="35" nodeType="afterEffect" fill="hold" presetClass="mediacall">
                                   <p:stCondLst>
                                     <p:cond delay="0"/>
                                   </p:stCondLst>
                                   <p:childTnLst>
                                     <p:cmd type="call" cmd="play">
                                       <p:cBhvr>
-                                        <p:cTn id="36" dur="4" fill="hold">
+                                        <p:cTn id="36" dur="1" fill="hold">
                                           <p:stCondLst>
                                             <p:cond delay="0"/>
                                           </p:stCondLst>
                                         </p:cTn>
                                         <p:tgtEl>
-                                          <p:spTgt spid="9"/>
+                                          <p:spTgt spid="14"/>
                                         </p:tgtEl>
                                       </p:cBhvr>
                                     </p:cmd>
@@ -1676,7 +2218,7 @@
       </p:grpSpPr>
       <p:sp>
         <p:nvSpPr>
-          <p:cNvPr id="14" name="PlaceHolder 1"/>
+          <p:cNvPr id="18" name="PlaceHolder 1"/>
           <p:cNvSpPr>
             <a:spLocks noGrp="1"/>
           </p:cNvSpPr>
@@ -1687,7 +2229,7 @@
         <p:spPr>
           <a:xfrm>
             <a:off x="504000" y="226080"/>
-            <a:ext cx="9071640" cy="946440"/>
+            <a:ext cx="9070920" cy="945720"/>
           </a:xfrm>
           <a:prstGeom prst="rect">
             <a:avLst/>
@@ -1703,7 +2245,13 @@
           </a:bodyPr>
           <a:p>
             <a:pPr indent="0" algn="ctr">
+              <a:lnSpc>
+                <a:spcPct val="100000"/>
+              </a:lnSpc>
               <a:buNone/>
+              <a:tabLst>
+                <a:tab algn="l" pos="0"/>
+              </a:tabLst>
             </a:pPr>
             <a:r>
               <a:rPr b="1" lang="en-US" sz="4400" strike="noStrike" u="none">
@@ -1715,7 +2263,7 @@
               </a:rPr>
               <a:t>Overview and Features</a:t>
             </a:r>
-            <a:endParaRPr b="1" lang="en-US" sz="4400" strike="noStrike" u="none">
+            <a:endParaRPr b="0" lang="en-US" sz="4400" strike="noStrike" u="none">
               <a:solidFill>
                 <a:srgbClr val="000000"/>
               </a:solidFill>
@@ -1727,7 +2275,7 @@
       </p:sp>
       <p:sp>
         <p:nvSpPr>
-          <p:cNvPr id="15" name="PlaceHolder 2"/>
+          <p:cNvPr id="19" name="PlaceHolder 2"/>
           <p:cNvSpPr>
             <a:spLocks noGrp="1"/>
           </p:cNvSpPr>
@@ -1738,7 +2286,7 @@
         <p:spPr>
           <a:xfrm>
             <a:off x="504000" y="1326600"/>
-            <a:ext cx="9071640" cy="3288240"/>
+            <a:ext cx="9070920" cy="3287520"/>
           </a:xfrm>
           <a:prstGeom prst="rect">
             <a:avLst/>
@@ -1750,10 +2298,13 @@
         </p:spPr>
         <p:txBody>
           <a:bodyPr lIns="0" rIns="0" tIns="0" bIns="0" anchor="t">
-            <a:normAutofit lnSpcReduction="9999"/>
+            <a:normAutofit fontScale="92500" lnSpcReduction="9999"/>
           </a:bodyPr>
           <a:p>
             <a:pPr marL="432000" indent="-324000">
+              <a:lnSpc>
+                <a:spcPct val="100000"/>
+              </a:lnSpc>
               <a:spcBef>
                 <a:spcPts val="1191"/>
               </a:spcBef>
@@ -1787,6 +2338,9 @@
           </a:p>
           <a:p>
             <a:pPr marL="432000" indent="-324000">
+              <a:lnSpc>
+                <a:spcPct val="100000"/>
+              </a:lnSpc>
               <a:spcBef>
                 <a:spcPts val="1191"/>
               </a:spcBef>
@@ -1820,6 +2374,9 @@
           </a:p>
           <a:p>
             <a:pPr lvl="1" marL="864000" indent="-324000">
+              <a:lnSpc>
+                <a:spcPct val="100000"/>
+              </a:lnSpc>
               <a:spcBef>
                 <a:spcPts val="1134"/>
               </a:spcBef>
@@ -1850,6 +2407,9 @@
           </a:p>
           <a:p>
             <a:pPr lvl="1" marL="864000" indent="-324000">
+              <a:lnSpc>
+                <a:spcPct val="100000"/>
+              </a:lnSpc>
               <a:spcBef>
                 <a:spcPts val="1134"/>
               </a:spcBef>
@@ -1880,6 +2440,9 @@
           </a:p>
           <a:p>
             <a:pPr lvl="1" marL="864000" indent="-324000">
+              <a:lnSpc>
+                <a:spcPct val="100000"/>
+              </a:lnSpc>
               <a:spcBef>
                 <a:spcPts val="1134"/>
               </a:spcBef>
@@ -1910,6 +2473,9 @@
           </a:p>
           <a:p>
             <a:pPr lvl="1" marL="864000" indent="-324000">
+              <a:lnSpc>
+                <a:spcPct val="100000"/>
+              </a:lnSpc>
               <a:spcBef>
                 <a:spcPts val="1134"/>
               </a:spcBef>
@@ -1940,6 +2506,9 @@
           </a:p>
           <a:p>
             <a:pPr lvl="2" marL="1296000" indent="-288000">
+              <a:lnSpc>
+                <a:spcPct val="100000"/>
+              </a:lnSpc>
               <a:spcBef>
                 <a:spcPts val="850"/>
               </a:spcBef>
@@ -1970,6 +2539,9 @@
           </a:p>
           <a:p>
             <a:pPr lvl="2" marL="1296000" indent="-288000">
+              <a:lnSpc>
+                <a:spcPct val="100000"/>
+              </a:lnSpc>
               <a:spcBef>
                 <a:spcPts val="850"/>
               </a:spcBef>
@@ -2000,6 +2572,9 @@
           </a:p>
           <a:p>
             <a:pPr lvl="2" marL="1296000" indent="-288000">
+              <a:lnSpc>
+                <a:spcPct val="100000"/>
+              </a:lnSpc>
               <a:spcBef>
                 <a:spcPts val="850"/>
               </a:spcBef>
@@ -2030,6 +2605,9 @@
           </a:p>
           <a:p>
             <a:pPr lvl="2" marL="1296000" indent="-288000">
+              <a:lnSpc>
+                <a:spcPct val="100000"/>
+              </a:lnSpc>
               <a:spcBef>
                 <a:spcPts val="850"/>
               </a:spcBef>
@@ -2092,7 +2670,7 @@
       </p:grpSpPr>
       <p:sp>
         <p:nvSpPr>
-          <p:cNvPr id="16" name="PlaceHolder 1"/>
+          <p:cNvPr id="20" name="PlaceHolder 1"/>
           <p:cNvSpPr>
             <a:spLocks noGrp="1"/>
           </p:cNvSpPr>
@@ -2103,7 +2681,7 @@
         <p:spPr>
           <a:xfrm>
             <a:off x="504000" y="226080"/>
-            <a:ext cx="9071640" cy="946440"/>
+            <a:ext cx="9070920" cy="945720"/>
           </a:xfrm>
           <a:prstGeom prst="rect">
             <a:avLst/>
@@ -2119,7 +2697,13 @@
           </a:bodyPr>
           <a:p>
             <a:pPr indent="0" algn="ctr">
+              <a:lnSpc>
+                <a:spcPct val="100000"/>
+              </a:lnSpc>
               <a:buNone/>
+              <a:tabLst>
+                <a:tab algn="l" pos="0"/>
+              </a:tabLst>
             </a:pPr>
             <a:r>
               <a:rPr b="0" lang="en-US" sz="4400" strike="noStrike" u="none">
@@ -2143,7 +2727,7 @@
       </p:sp>
       <p:pic>
         <p:nvPicPr>
-          <p:cNvPr id="17" name="" descr=""/>
+          <p:cNvPr id="21" name="" descr=""/>
           <p:cNvPicPr/>
           <p:nvPr/>
         </p:nvPicPr>
@@ -2154,7 +2738,7 @@
         <p:spPr>
           <a:xfrm>
             <a:off x="5046840" y="1326600"/>
-            <a:ext cx="4554360" cy="3288240"/>
+            <a:ext cx="4553640" cy="3287520"/>
           </a:xfrm>
           <a:prstGeom prst="rect">
             <a:avLst/>
@@ -2166,14 +2750,14 @@
       </p:pic>
       <p:sp>
         <p:nvSpPr>
-          <p:cNvPr id="18" name=""/>
-          <p:cNvSpPr txBox="1"/>
+          <p:cNvPr id="22" name=""/>
+          <p:cNvSpPr/>
           <p:nvPr/>
         </p:nvSpPr>
         <p:spPr>
           <a:xfrm>
             <a:off x="457200" y="1371600"/>
-            <a:ext cx="4343400" cy="4114800"/>
+            <a:ext cx="4342680" cy="4114080"/>
           </a:xfrm>
           <a:prstGeom prst="rect">
             <a:avLst/>
@@ -2183,11 +2767,22 @@
             <a:noFill/>
           </a:ln>
         </p:spPr>
+        <p:style>
+          <a:lnRef idx="0"/>
+          <a:fillRef idx="0"/>
+          <a:effectRef idx="0"/>
+          <a:fontRef idx="minor"/>
+        </p:style>
         <p:txBody>
           <a:bodyPr lIns="90000" rIns="90000" tIns="45000" bIns="45000" anchor="t">
             <a:noAutofit/>
           </a:bodyPr>
           <a:p>
+            <a:pPr>
+              <a:lnSpc>
+                <a:spcPct val="100000"/>
+              </a:lnSpc>
+            </a:pPr>
             <a:r>
               <a:rPr b="1" lang="en-US" sz="1400" strike="noStrike" u="none">
                 <a:solidFill>
@@ -2195,6 +2790,7 @@
                 </a:solidFill>
                 <a:uFillTx/>
                 <a:latin typeface="Arial"/>
+                <a:ea typeface="DejaVu Sans"/>
               </a:rPr>
               <a:t>Users</a:t>
             </a:r>
@@ -2205,6 +2801,7 @@
                 </a:solidFill>
                 <a:uFillTx/>
                 <a:latin typeface="Arial"/>
+                <a:ea typeface="DejaVu Sans"/>
               </a:rPr>
               <a:t> to </a:t>
             </a:r>
@@ -2215,6 +2812,7 @@
                 </a:solidFill>
                 <a:uFillTx/>
                 <a:latin typeface="Arial"/>
+                <a:ea typeface="DejaVu Sans"/>
               </a:rPr>
               <a:t>Orders</a:t>
             </a:r>
@@ -2225,27 +2823,38 @@
                 </a:solidFill>
                 <a:uFillTx/>
                 <a:latin typeface="Arial"/>
+                <a:ea typeface="DejaVu Sans"/>
               </a:rPr>
               <a:t> is a one-to-many relationship, as a single user can place multiple orders. Each order is associated with one user, identified by the user_id foreign key in the Orders table. For example: If you have a user who places three orders, there will be three records in the Orders table with the same user_id, indicating that all these orders belong to that single user.</a:t>
             </a:r>
-            <a:endParaRPr b="1" lang="en-US" sz="1400" strike="noStrike" u="none">
-              <a:solidFill>
-                <a:srgbClr val="000000"/>
-              </a:solidFill>
-              <a:uFillTx/>
-              <a:latin typeface="Arial"/>
-            </a:endParaRPr>
-          </a:p>
-          <a:p>
-            <a:endParaRPr b="1" lang="en-US" sz="1400" strike="noStrike" u="none">
-              <a:solidFill>
-                <a:srgbClr val="000000"/>
-              </a:solidFill>
-              <a:uFillTx/>
-              <a:latin typeface="Arial"/>
-            </a:endParaRPr>
-          </a:p>
-          <a:p>
+            <a:endParaRPr b="0" lang="en-US" sz="1400" strike="noStrike" u="none">
+              <a:solidFill>
+                <a:srgbClr val="000000"/>
+              </a:solidFill>
+              <a:uFillTx/>
+              <a:latin typeface="Arial"/>
+            </a:endParaRPr>
+          </a:p>
+          <a:p>
+            <a:pPr>
+              <a:lnSpc>
+                <a:spcPct val="100000"/>
+              </a:lnSpc>
+            </a:pPr>
+            <a:endParaRPr b="0" lang="en-US" sz="1400" strike="noStrike" u="none">
+              <a:solidFill>
+                <a:srgbClr val="000000"/>
+              </a:solidFill>
+              <a:uFillTx/>
+              <a:latin typeface="Arial"/>
+            </a:endParaRPr>
+          </a:p>
+          <a:p>
+            <a:pPr>
+              <a:lnSpc>
+                <a:spcPct val="100000"/>
+              </a:lnSpc>
+            </a:pPr>
             <a:r>
               <a:rPr b="1" lang="en-US" sz="1400" strike="noStrike" u="none">
                 <a:solidFill>
@@ -2253,6 +2862,7 @@
                 </a:solidFill>
                 <a:uFillTx/>
                 <a:latin typeface="Arial"/>
+                <a:ea typeface="DejaVu Sans"/>
               </a:rPr>
               <a:t>Gordys_Novelties</a:t>
             </a:r>
@@ -2263,6 +2873,7 @@
                 </a:solidFill>
                 <a:uFillTx/>
                 <a:latin typeface="Arial"/>
+                <a:ea typeface="DejaVu Sans"/>
               </a:rPr>
               <a:t> to </a:t>
             </a:r>
@@ -2273,6 +2884,7 @@
                 </a:solidFill>
                 <a:uFillTx/>
                 <a:latin typeface="Arial"/>
+                <a:ea typeface="DejaVu Sans"/>
               </a:rPr>
               <a:t>Orders</a:t>
             </a:r>
@@ -2283,10 +2895,11 @@
                 </a:solidFill>
                 <a:uFillTx/>
                 <a:latin typeface="Arial"/>
+                <a:ea typeface="DejaVu Sans"/>
               </a:rPr>
               <a:t> is also a one-to-many relationship, since a single  product can be included in multiple orders. Each order references one product, identified by the product_id foreign key in the Orders table. An example is if a particular  product, such as “Settlers of Catan” is ordered multiple times by different users or the same user, there will be multiple records in the orders table with the same product_id pointing to “Settlers of Catan”.</a:t>
             </a:r>
-            <a:endParaRPr b="1" lang="en-US" sz="1400" strike="noStrike" u="none">
+            <a:endParaRPr b="0" lang="en-US" sz="1400" strike="noStrike" u="none">
               <a:solidFill>
                 <a:srgbClr val="000000"/>
               </a:solidFill>
@@ -2328,7 +2941,7 @@
       </p:grpSpPr>
       <p:sp>
         <p:nvSpPr>
-          <p:cNvPr id="19" name="PlaceHolder 1"/>
+          <p:cNvPr id="23" name="PlaceHolder 1"/>
           <p:cNvSpPr>
             <a:spLocks noGrp="1"/>
           </p:cNvSpPr>
@@ -2339,7 +2952,7 @@
         <p:spPr>
           <a:xfrm>
             <a:off x="504000" y="226080"/>
-            <a:ext cx="9071640" cy="946440"/>
+            <a:ext cx="9070920" cy="945720"/>
           </a:xfrm>
           <a:prstGeom prst="rect">
             <a:avLst/>
@@ -2355,7 +2968,13 @@
           </a:bodyPr>
           <a:p>
             <a:pPr indent="0" algn="ctr">
+              <a:lnSpc>
+                <a:spcPct val="100000"/>
+              </a:lnSpc>
               <a:buNone/>
+              <a:tabLst>
+                <a:tab algn="l" pos="0"/>
+              </a:tabLst>
             </a:pPr>
             <a:r>
               <a:rPr b="1" lang="en-US" sz="4400" strike="noStrike" u="none">
@@ -2367,7 +2986,7 @@
               </a:rPr>
               <a:t>Tech Stack</a:t>
             </a:r>
-            <a:endParaRPr b="1" lang="en-US" sz="4400" strike="noStrike" u="none">
+            <a:endParaRPr b="0" lang="en-US" sz="4400" strike="noStrike" u="none">
               <a:solidFill>
                 <a:srgbClr val="000000"/>
               </a:solidFill>
@@ -2379,7 +2998,7 @@
       </p:sp>
       <p:sp>
         <p:nvSpPr>
-          <p:cNvPr id="20" name="PlaceHolder 2"/>
+          <p:cNvPr id="24" name="PlaceHolder 2"/>
           <p:cNvSpPr>
             <a:spLocks noGrp="1"/>
           </p:cNvSpPr>
@@ -2390,7 +3009,7 @@
         <p:spPr>
           <a:xfrm>
             <a:off x="504000" y="1326600"/>
-            <a:ext cx="9071640" cy="3288240"/>
+            <a:ext cx="9070920" cy="3287520"/>
           </a:xfrm>
           <a:prstGeom prst="rect">
             <a:avLst/>
@@ -2406,6 +3025,9 @@
           </a:bodyPr>
           <a:p>
             <a:pPr marL="432000" indent="-324000">
+              <a:lnSpc>
+                <a:spcPct val="100000"/>
+              </a:lnSpc>
               <a:spcBef>
                 <a:spcPts val="1191"/>
               </a:spcBef>
@@ -2429,7 +3051,7 @@
               </a:rPr>
               <a:t>Python 3.x</a:t>
             </a:r>
-            <a:endParaRPr b="1" lang="en-US" sz="2400" strike="noStrike" u="none">
+            <a:endParaRPr b="0" lang="en-US" sz="2400" strike="noStrike" u="none">
               <a:solidFill>
                 <a:srgbClr val="000000"/>
               </a:solidFill>
@@ -2439,6 +3061,9 @@
           </a:p>
           <a:p>
             <a:pPr marL="432000" indent="-324000">
+              <a:lnSpc>
+                <a:spcPct val="100000"/>
+              </a:lnSpc>
               <a:spcBef>
                 <a:spcPts val="1191"/>
               </a:spcBef>
@@ -2462,7 +3087,7 @@
               </a:rPr>
               <a:t>MySQL</a:t>
             </a:r>
-            <a:endParaRPr b="1" lang="en-US" sz="2400" strike="noStrike" u="none">
+            <a:endParaRPr b="0" lang="en-US" sz="2400" strike="noStrike" u="none">
               <a:solidFill>
                 <a:srgbClr val="000000"/>
               </a:solidFill>
@@ -2472,6 +3097,9 @@
           </a:p>
           <a:p>
             <a:pPr marL="432000" indent="-324000">
+              <a:lnSpc>
+                <a:spcPct val="100000"/>
+              </a:lnSpc>
               <a:spcBef>
                 <a:spcPts val="1191"/>
               </a:spcBef>
@@ -2495,7 +3123,7 @@
               </a:rPr>
               <a:t>VS Code</a:t>
             </a:r>
-            <a:endParaRPr b="1" lang="en-US" sz="2400" strike="noStrike" u="none">
+            <a:endParaRPr b="0" lang="en-US" sz="2400" strike="noStrike" u="none">
               <a:solidFill>
                 <a:srgbClr val="000000"/>
               </a:solidFill>
@@ -2505,6 +3133,9 @@
           </a:p>
           <a:p>
             <a:pPr marL="432000" indent="-324000">
+              <a:lnSpc>
+                <a:spcPct val="100000"/>
+              </a:lnSpc>
               <a:spcBef>
                 <a:spcPts val="1191"/>
               </a:spcBef>
@@ -2528,7 +3159,7 @@
               </a:rPr>
               <a:t>Git</a:t>
             </a:r>
-            <a:endParaRPr b="1" lang="en-US" sz="2400" strike="noStrike" u="none">
+            <a:endParaRPr b="0" lang="en-US" sz="2400" strike="noStrike" u="none">
               <a:solidFill>
                 <a:srgbClr val="000000"/>
               </a:solidFill>
@@ -2655,4 +3286,110 @@
     </a:fmtScheme>
   </a:themeElements>
 </a:theme>
+</file>
+
+<file path=ppt/theme/theme2.xml><?xml version="1.0" encoding="utf-8"?>
+<a:theme xmlns:a="http://schemas.openxmlformats.org/drawingml/2006/main" xmlns:r="http://schemas.openxmlformats.org/officeDocument/2006/relationships" name="Office">
+  <a:themeElements>
+    <a:clrScheme name="LibreOffice">
+      <a:dk1>
+        <a:srgbClr val="000000"/>
+      </a:dk1>
+      <a:lt1>
+        <a:srgbClr val="ffffff"/>
+      </a:lt1>
+      <a:dk2>
+        <a:srgbClr val="000000"/>
+      </a:dk2>
+      <a:lt2>
+        <a:srgbClr val="ffffff"/>
+      </a:lt2>
+      <a:accent1>
+        <a:srgbClr val="18a303"/>
+      </a:accent1>
+      <a:accent2>
+        <a:srgbClr val="0369a3"/>
+      </a:accent2>
+      <a:accent3>
+        <a:srgbClr val="a33e03"/>
+      </a:accent3>
+      <a:accent4>
+        <a:srgbClr val="8e03a3"/>
+      </a:accent4>
+      <a:accent5>
+        <a:srgbClr val="c99c00"/>
+      </a:accent5>
+      <a:accent6>
+        <a:srgbClr val="c9211e"/>
+      </a:accent6>
+      <a:hlink>
+        <a:srgbClr val="0000ee"/>
+      </a:hlink>
+      <a:folHlink>
+        <a:srgbClr val="551a8b"/>
+      </a:folHlink>
+    </a:clrScheme>
+    <a:fontScheme name="Office">
+      <a:majorFont>
+        <a:latin typeface="Arial" pitchFamily="0" charset="1"/>
+        <a:ea typeface="DejaVu Sans" pitchFamily="0" charset="1"/>
+        <a:cs typeface="DejaVu Sans" pitchFamily="0" charset="1"/>
+      </a:majorFont>
+      <a:minorFont>
+        <a:latin typeface="Arial" pitchFamily="0" charset="1"/>
+        <a:ea typeface="DejaVu Sans" pitchFamily="0" charset="1"/>
+        <a:cs typeface="DejaVu Sans" pitchFamily="0" charset="1"/>
+      </a:minorFont>
+    </a:fontScheme>
+    <a:fmtScheme>
+      <a:fillStyleLst>
+        <a:solidFill>
+          <a:schemeClr val="phClr"/>
+        </a:solidFill>
+        <a:solidFill>
+          <a:schemeClr val="phClr"/>
+        </a:solidFill>
+        <a:solidFill>
+          <a:schemeClr val="phClr"/>
+        </a:solidFill>
+      </a:fillStyleLst>
+      <a:lnStyleLst>
+        <a:ln w="6350" cap="flat" cmpd="sng" algn="ctr">
+          <a:prstDash val="solid"/>
+          <a:miter/>
+        </a:ln>
+        <a:ln w="6350" cap="flat" cmpd="sng" algn="ctr">
+          <a:prstDash val="solid"/>
+          <a:miter/>
+        </a:ln>
+        <a:ln w="6350" cap="flat" cmpd="sng" algn="ctr">
+          <a:prstDash val="solid"/>
+          <a:miter/>
+        </a:ln>
+      </a:lnStyleLst>
+      <a:effectStyleLst>
+        <a:effectStyle>
+          <a:effectLst/>
+        </a:effectStyle>
+        <a:effectStyle>
+          <a:effectLst/>
+        </a:effectStyle>
+        <a:effectStyle>
+          <a:effectLst/>
+        </a:effectStyle>
+      </a:effectStyleLst>
+      <a:bgFillStyleLst>
+        <a:solidFill>
+          <a:schemeClr val="phClr"/>
+        </a:solidFill>
+        <a:solidFill>
+          <a:schemeClr val="phClr"/>
+        </a:solidFill>
+        <a:solidFill>
+          <a:schemeClr val="phClr"/>
+        </a:solidFill>
+      </a:bgFillStyleLst>
+    </a:fmtScheme>
+  </a:themeElements>
+</a:theme>
 </file>
</xml_diff>